<commit_message>
Presentation updated. Not finished, but tired
</commit_message>
<xml_diff>
--- a/Final presentation slides.pptx
+++ b/Final presentation slides.pptx
@@ -15,12 +15,19 @@
     <p:sldId id="263" r:id="rId9"/>
     <p:sldId id="264" r:id="rId10"/>
     <p:sldId id="265" r:id="rId11"/>
-    <p:sldId id="266" r:id="rId12"/>
-    <p:sldId id="270" r:id="rId13"/>
-    <p:sldId id="267" r:id="rId14"/>
-    <p:sldId id="268" r:id="rId15"/>
-    <p:sldId id="269" r:id="rId16"/>
-    <p:sldId id="271" r:id="rId17"/>
+    <p:sldId id="272" r:id="rId12"/>
+    <p:sldId id="273" r:id="rId13"/>
+    <p:sldId id="274" r:id="rId14"/>
+    <p:sldId id="266" r:id="rId15"/>
+    <p:sldId id="270" r:id="rId16"/>
+    <p:sldId id="267" r:id="rId17"/>
+    <p:sldId id="268" r:id="rId18"/>
+    <p:sldId id="275" r:id="rId19"/>
+    <p:sldId id="276" r:id="rId20"/>
+    <p:sldId id="277" r:id="rId21"/>
+    <p:sldId id="278" r:id="rId22"/>
+    <p:sldId id="269" r:id="rId23"/>
+    <p:sldId id="271" r:id="rId24"/>
   </p:sldIdLst>
   <p:sldSz cx="12192000" cy="6858000"/>
   <p:notesSz cx="6858000" cy="9144000"/>
@@ -119,6 +126,11 @@
       </a:defRPr>
     </a:lvl9pPr>
   </p:defaultTextStyle>
+  <p:extLst>
+    <p:ext uri="{EFAFB233-063F-42B5-8137-9DF3F51BA10A}">
+      <p15:sldGuideLst xmlns:p15="http://schemas.microsoft.com/office/powerpoint/2012/main"/>
+    </p:ext>
+  </p:extLst>
 </p:presentation>
 </file>
 
@@ -323,7 +335,7 @@
             <a:fld id="{5586B75A-687E-405C-8A0B-8D00578BA2C3}" type="datetimeFigureOut">
               <a:rPr lang="en-US" dirty="0"/>
               <a:pPr/>
-              <a:t>5/13/2014</a:t>
+              <a:t>5/14/2014</a:t>
             </a:fld>
             <a:endParaRPr lang="en-US" dirty="0"/>
           </a:p>
@@ -509,7 +521,7 @@
           <a:p>
             <a:fld id="{5F4E5243-F52A-4D37-9694-EB26C6C31910}" type="datetimeFigureOut">
               <a:rPr lang="en-US" dirty="0"/>
-              <a:t>5/13/2014</a:t>
+              <a:t>5/14/2014</a:t>
             </a:fld>
             <a:endParaRPr lang="en-US" dirty="0"/>
           </a:p>
@@ -684,7 +696,7 @@
           <a:p>
             <a:fld id="{3A77B6E1-634A-48DC-9E8B-D894023267EF}" type="datetimeFigureOut">
               <a:rPr lang="en-US" dirty="0"/>
-              <a:t>5/13/2014</a:t>
+              <a:t>5/14/2014</a:t>
             </a:fld>
             <a:endParaRPr lang="en-US" dirty="0"/>
           </a:p>
@@ -849,7 +861,7 @@
           <a:p>
             <a:fld id="{7B2D3E9E-A95C-48F2-B4BF-A71542E0BE9A}" type="datetimeFigureOut">
               <a:rPr lang="en-US" dirty="0"/>
-              <a:t>5/13/2014</a:t>
+              <a:t>5/14/2014</a:t>
             </a:fld>
             <a:endParaRPr lang="en-US" dirty="0"/>
           </a:p>
@@ -1101,7 +1113,7 @@
             <a:fld id="{5586B75A-687E-405C-8A0B-8D00578BA2C3}" type="datetimeFigureOut">
               <a:rPr lang="en-US" dirty="0"/>
               <a:pPr/>
-              <a:t>5/13/2014</a:t>
+              <a:t>5/14/2014</a:t>
             </a:fld>
             <a:endParaRPr lang="en-US" dirty="0"/>
           </a:p>
@@ -1385,7 +1397,7 @@
           <a:p>
             <a:fld id="{F12952B5-7A2F-4CC8-B7CE-9234E21C2837}" type="datetimeFigureOut">
               <a:rPr lang="en-US" dirty="0"/>
-              <a:t>5/13/2014</a:t>
+              <a:t>5/14/2014</a:t>
             </a:fld>
             <a:endParaRPr lang="en-US" dirty="0"/>
           </a:p>
@@ -1818,7 +1830,7 @@
           <a:p>
             <a:fld id="{CE1DA07A-9201-4B4B-BAF2-015AFA30F520}" type="datetimeFigureOut">
               <a:rPr lang="en-US" dirty="0"/>
-              <a:t>5/13/2014</a:t>
+              <a:t>5/14/2014</a:t>
             </a:fld>
             <a:endParaRPr lang="en-US" dirty="0"/>
           </a:p>
@@ -1931,7 +1943,7 @@
           <a:p>
             <a:fld id="{73D7E00A-486F-4252-8B1D-E32645521F49}" type="datetimeFigureOut">
               <a:rPr lang="en-US" dirty="0"/>
-              <a:t>5/13/2014</a:t>
+              <a:t>5/14/2014</a:t>
             </a:fld>
             <a:endParaRPr lang="en-US" dirty="0"/>
           </a:p>
@@ -2021,7 +2033,7 @@
           <a:p>
             <a:fld id="{8DDF5F92-E675-4B36-9A60-69A962A68675}" type="datetimeFigureOut">
               <a:rPr lang="en-US" dirty="0"/>
-              <a:t>5/13/2014</a:t>
+              <a:t>5/14/2014</a:t>
             </a:fld>
             <a:endParaRPr lang="en-US" dirty="0"/>
           </a:p>
@@ -2372,7 +2384,7 @@
           <a:p>
             <a:fld id="{AF6E2C9B-5FA2-460D-9BE7-B0812FC2A6FF}" type="datetimeFigureOut">
               <a:rPr lang="en-US" dirty="0"/>
-              <a:t>5/13/2014</a:t>
+              <a:t>5/14/2014</a:t>
             </a:fld>
             <a:endParaRPr lang="en-US" dirty="0"/>
           </a:p>
@@ -2685,7 +2697,7 @@
             <a:fld id="{5586B75A-687E-405C-8A0B-8D00578BA2C3}" type="datetimeFigureOut">
               <a:rPr lang="en-US" dirty="0"/>
               <a:pPr/>
-              <a:t>5/13/2014</a:t>
+              <a:t>5/14/2014</a:t>
             </a:fld>
             <a:endParaRPr lang="en-US" dirty="0"/>
           </a:p>
@@ -2915,7 +2927,7 @@
             <a:fld id="{5586B75A-687E-405C-8A0B-8D00578BA2C3}" type="datetimeFigureOut">
               <a:rPr lang="en-US" dirty="0"/>
               <a:pPr/>
-              <a:t>5/13/2014</a:t>
+              <a:t>5/14/2014</a:t>
             </a:fld>
             <a:endParaRPr lang="en-US" dirty="0"/>
           </a:p>
@@ -3581,9 +3593,547 @@
           <a:bodyPr/>
           <a:lstStyle/>
           <a:p>
-            <a:r>
-              <a:rPr lang="en-US" dirty="0" smtClean="0"/>
-              <a:t>Depression: Losing My Religion</a:t>
+            <a:endParaRPr lang="en-US"/>
+          </a:p>
+        </p:txBody>
+      </p:sp>
+      <p:pic>
+        <p:nvPicPr>
+          <p:cNvPr id="5" name="Picture 4"/>
+          <p:cNvPicPr>
+            <a:picLocks noChangeAspect="1"/>
+          </p:cNvPicPr>
+          <p:nvPr/>
+        </p:nvPicPr>
+        <p:blipFill>
+          <a:blip r:embed="rId2">
+            <a:extLst>
+              <a:ext uri="{28A0092B-C50C-407E-A947-70E740481C1C}">
+                <a14:useLocalDpi xmlns:a14="http://schemas.microsoft.com/office/drawing/2010/main" val="0"/>
+              </a:ext>
+            </a:extLst>
+          </a:blip>
+          <a:stretch>
+            <a:fillRect/>
+          </a:stretch>
+        </p:blipFill>
+        <p:spPr>
+          <a:xfrm>
+            <a:off x="-10280" y="-37093"/>
+            <a:ext cx="4024916" cy="2167262"/>
+          </a:xfrm>
+          <a:prstGeom prst="rect">
+            <a:avLst/>
+          </a:prstGeom>
+        </p:spPr>
+      </p:pic>
+      <p:pic>
+        <p:nvPicPr>
+          <p:cNvPr id="6" name="Picture 5"/>
+          <p:cNvPicPr>
+            <a:picLocks noChangeAspect="1"/>
+          </p:cNvPicPr>
+          <p:nvPr/>
+        </p:nvPicPr>
+        <p:blipFill>
+          <a:blip r:embed="rId3">
+            <a:extLst>
+              <a:ext uri="{28A0092B-C50C-407E-A947-70E740481C1C}">
+                <a14:useLocalDpi xmlns:a14="http://schemas.microsoft.com/office/drawing/2010/main" val="0"/>
+              </a:ext>
+            </a:extLst>
+          </a:blip>
+          <a:stretch>
+            <a:fillRect/>
+          </a:stretch>
+        </p:blipFill>
+        <p:spPr>
+          <a:xfrm>
+            <a:off x="3639389" y="4684948"/>
+            <a:ext cx="3696387" cy="2249446"/>
+          </a:xfrm>
+          <a:prstGeom prst="rect">
+            <a:avLst/>
+          </a:prstGeom>
+        </p:spPr>
+      </p:pic>
+      <p:pic>
+        <p:nvPicPr>
+          <p:cNvPr id="7" name="Picture 6"/>
+          <p:cNvPicPr>
+            <a:picLocks noChangeAspect="1"/>
+          </p:cNvPicPr>
+          <p:nvPr/>
+        </p:nvPicPr>
+        <p:blipFill>
+          <a:blip r:embed="rId4">
+            <a:extLst>
+              <a:ext uri="{28A0092B-C50C-407E-A947-70E740481C1C}">
+                <a14:useLocalDpi xmlns:a14="http://schemas.microsoft.com/office/drawing/2010/main" val="0"/>
+              </a:ext>
+            </a:extLst>
+          </a:blip>
+          <a:stretch>
+            <a:fillRect/>
+          </a:stretch>
+        </p:blipFill>
+        <p:spPr>
+          <a:xfrm>
+            <a:off x="3651315" y="-83596"/>
+            <a:ext cx="4032866" cy="3493257"/>
+          </a:xfrm>
+          <a:prstGeom prst="rect">
+            <a:avLst/>
+          </a:prstGeom>
+        </p:spPr>
+      </p:pic>
+      <p:pic>
+        <p:nvPicPr>
+          <p:cNvPr id="8" name="Picture 7"/>
+          <p:cNvPicPr>
+            <a:picLocks noChangeAspect="1"/>
+          </p:cNvPicPr>
+          <p:nvPr/>
+        </p:nvPicPr>
+        <p:blipFill>
+          <a:blip r:embed="rId5">
+            <a:extLst>
+              <a:ext uri="{28A0092B-C50C-407E-A947-70E740481C1C}">
+                <a14:useLocalDpi xmlns:a14="http://schemas.microsoft.com/office/drawing/2010/main" val="0"/>
+              </a:ext>
+            </a:extLst>
+          </a:blip>
+          <a:stretch>
+            <a:fillRect/>
+          </a:stretch>
+        </p:blipFill>
+        <p:spPr>
+          <a:xfrm>
+            <a:off x="7687187" y="15668"/>
+            <a:ext cx="4504813" cy="2432269"/>
+          </a:xfrm>
+          <a:prstGeom prst="rect">
+            <a:avLst/>
+          </a:prstGeom>
+        </p:spPr>
+      </p:pic>
+      <p:pic>
+        <p:nvPicPr>
+          <p:cNvPr id="10" name="Picture 9"/>
+          <p:cNvPicPr>
+            <a:picLocks noChangeAspect="1"/>
+          </p:cNvPicPr>
+          <p:nvPr/>
+        </p:nvPicPr>
+        <p:blipFill>
+          <a:blip r:embed="rId6">
+            <a:extLst>
+              <a:ext uri="{28A0092B-C50C-407E-A947-70E740481C1C}">
+                <a14:useLocalDpi xmlns:a14="http://schemas.microsoft.com/office/drawing/2010/main" val="0"/>
+              </a:ext>
+            </a:extLst>
+          </a:blip>
+          <a:stretch>
+            <a:fillRect/>
+          </a:stretch>
+        </p:blipFill>
+        <p:spPr>
+          <a:xfrm>
+            <a:off x="-3372" y="2157731"/>
+            <a:ext cx="4693403" cy="2527217"/>
+          </a:xfrm>
+          <a:prstGeom prst="rect">
+            <a:avLst/>
+          </a:prstGeom>
+        </p:spPr>
+      </p:pic>
+      <p:pic>
+        <p:nvPicPr>
+          <p:cNvPr id="11" name="Picture 10"/>
+          <p:cNvPicPr>
+            <a:picLocks noChangeAspect="1"/>
+          </p:cNvPicPr>
+          <p:nvPr/>
+        </p:nvPicPr>
+        <p:blipFill>
+          <a:blip r:embed="rId7">
+            <a:extLst>
+              <a:ext uri="{28A0092B-C50C-407E-A947-70E740481C1C}">
+                <a14:useLocalDpi xmlns:a14="http://schemas.microsoft.com/office/drawing/2010/main" val="0"/>
+              </a:ext>
+            </a:extLst>
+          </a:blip>
+          <a:stretch>
+            <a:fillRect/>
+          </a:stretch>
+        </p:blipFill>
+        <p:spPr>
+          <a:xfrm>
+            <a:off x="0" y="4550187"/>
+            <a:ext cx="3699994" cy="1681816"/>
+          </a:xfrm>
+          <a:prstGeom prst="rect">
+            <a:avLst/>
+          </a:prstGeom>
+        </p:spPr>
+      </p:pic>
+      <p:pic>
+        <p:nvPicPr>
+          <p:cNvPr id="9" name="Picture 8"/>
+          <p:cNvPicPr>
+            <a:picLocks noChangeAspect="1"/>
+          </p:cNvPicPr>
+          <p:nvPr/>
+        </p:nvPicPr>
+        <p:blipFill>
+          <a:blip r:embed="rId8">
+            <a:extLst>
+              <a:ext uri="{28A0092B-C50C-407E-A947-70E740481C1C}">
+                <a14:useLocalDpi xmlns:a14="http://schemas.microsoft.com/office/drawing/2010/main" val="0"/>
+              </a:ext>
+            </a:extLst>
+          </a:blip>
+          <a:stretch>
+            <a:fillRect/>
+          </a:stretch>
+        </p:blipFill>
+        <p:spPr>
+          <a:xfrm>
+            <a:off x="4428295" y="2192858"/>
+            <a:ext cx="4531580" cy="2456961"/>
+          </a:xfrm>
+          <a:prstGeom prst="rect">
+            <a:avLst/>
+          </a:prstGeom>
+        </p:spPr>
+      </p:pic>
+      <p:pic>
+        <p:nvPicPr>
+          <p:cNvPr id="4" name="Content Placeholder 3"/>
+          <p:cNvPicPr>
+            <a:picLocks noGrp="1" noChangeAspect="1"/>
+          </p:cNvPicPr>
+          <p:nvPr>
+            <p:ph idx="1"/>
+          </p:nvPr>
+        </p:nvPicPr>
+        <p:blipFill>
+          <a:blip r:embed="rId9">
+            <a:extLst>
+              <a:ext uri="{28A0092B-C50C-407E-A947-70E740481C1C}">
+                <a14:useLocalDpi xmlns:a14="http://schemas.microsoft.com/office/drawing/2010/main" val="0"/>
+              </a:ext>
+            </a:extLst>
+          </a:blip>
+          <a:stretch>
+            <a:fillRect/>
+          </a:stretch>
+        </p:blipFill>
+        <p:spPr>
+          <a:xfrm>
+            <a:off x="6839988" y="3438422"/>
+            <a:ext cx="5352012" cy="3313578"/>
+          </a:xfrm>
+        </p:spPr>
+      </p:pic>
+    </p:spTree>
+    <p:extLst>
+      <p:ext uri="{BB962C8B-B14F-4D97-AF65-F5344CB8AC3E}">
+        <p14:creationId xmlns:p14="http://schemas.microsoft.com/office/powerpoint/2010/main" val="1332413103"/>
+      </p:ext>
+    </p:extLst>
+  </p:cSld>
+  <p:clrMapOvr>
+    <a:masterClrMapping/>
+  </p:clrMapOvr>
+</p:sld>
+</file>
+
+<file path=ppt/slides/slide12.xml><?xml version="1.0" encoding="utf-8"?>
+<p:sld xmlns:a="http://schemas.openxmlformats.org/drawingml/2006/main" xmlns:r="http://schemas.openxmlformats.org/officeDocument/2006/relationships" xmlns:p="http://schemas.openxmlformats.org/presentationml/2006/main">
+  <p:cSld>
+    <p:spTree>
+      <p:nvGrpSpPr>
+        <p:cNvPr id="1" name=""/>
+        <p:cNvGrpSpPr/>
+        <p:nvPr/>
+      </p:nvGrpSpPr>
+      <p:grpSpPr>
+        <a:xfrm>
+          <a:off x="0" y="0"/>
+          <a:ext cx="0" cy="0"/>
+          <a:chOff x="0" y="0"/>
+          <a:chExt cx="0" cy="0"/>
+        </a:xfrm>
+      </p:grpSpPr>
+      <p:sp>
+        <p:nvSpPr>
+          <p:cNvPr id="2" name="Title 1"/>
+          <p:cNvSpPr>
+            <a:spLocks noGrp="1"/>
+          </p:cNvSpPr>
+          <p:nvPr>
+            <p:ph type="title"/>
+          </p:nvPr>
+        </p:nvSpPr>
+        <p:spPr/>
+        <p:txBody>
+          <a:bodyPr/>
+          <a:lstStyle/>
+          <a:p>
+            <a:endParaRPr lang="en-US"/>
+          </a:p>
+        </p:txBody>
+      </p:sp>
+      <p:pic>
+        <p:nvPicPr>
+          <p:cNvPr id="5" name="Picture 4"/>
+          <p:cNvPicPr>
+            <a:picLocks noChangeAspect="1"/>
+          </p:cNvPicPr>
+          <p:nvPr/>
+        </p:nvPicPr>
+        <p:blipFill>
+          <a:blip r:embed="rId2">
+            <a:extLst>
+              <a:ext uri="{28A0092B-C50C-407E-A947-70E740481C1C}">
+                <a14:useLocalDpi xmlns:a14="http://schemas.microsoft.com/office/drawing/2010/main" val="0"/>
+              </a:ext>
+            </a:extLst>
+          </a:blip>
+          <a:stretch>
+            <a:fillRect/>
+          </a:stretch>
+        </p:blipFill>
+        <p:spPr>
+          <a:xfrm>
+            <a:off x="0" y="3474649"/>
+            <a:ext cx="6341678" cy="3036569"/>
+          </a:xfrm>
+          <a:prstGeom prst="rect">
+            <a:avLst/>
+          </a:prstGeom>
+        </p:spPr>
+      </p:pic>
+      <p:pic>
+        <p:nvPicPr>
+          <p:cNvPr id="6" name="Picture 5"/>
+          <p:cNvPicPr>
+            <a:picLocks noChangeAspect="1"/>
+          </p:cNvPicPr>
+          <p:nvPr/>
+        </p:nvPicPr>
+        <p:blipFill>
+          <a:blip r:embed="rId3">
+            <a:extLst>
+              <a:ext uri="{28A0092B-C50C-407E-A947-70E740481C1C}">
+                <a14:useLocalDpi xmlns:a14="http://schemas.microsoft.com/office/drawing/2010/main" val="0"/>
+              </a:ext>
+            </a:extLst>
+          </a:blip>
+          <a:stretch>
+            <a:fillRect/>
+          </a:stretch>
+        </p:blipFill>
+        <p:spPr>
+          <a:xfrm>
+            <a:off x="6082233" y="150565"/>
+            <a:ext cx="6041524" cy="4269035"/>
+          </a:xfrm>
+          <a:prstGeom prst="rect">
+            <a:avLst/>
+          </a:prstGeom>
+        </p:spPr>
+      </p:pic>
+      <p:pic>
+        <p:nvPicPr>
+          <p:cNvPr id="7" name="Picture 6"/>
+          <p:cNvPicPr>
+            <a:picLocks noChangeAspect="1"/>
+          </p:cNvPicPr>
+          <p:nvPr/>
+        </p:nvPicPr>
+        <p:blipFill>
+          <a:blip r:embed="rId4">
+            <a:extLst>
+              <a:ext uri="{28A0092B-C50C-407E-A947-70E740481C1C}">
+                <a14:useLocalDpi xmlns:a14="http://schemas.microsoft.com/office/drawing/2010/main" val="0"/>
+              </a:ext>
+            </a:extLst>
+          </a:blip>
+          <a:stretch>
+            <a:fillRect/>
+          </a:stretch>
+        </p:blipFill>
+        <p:spPr>
+          <a:xfrm>
+            <a:off x="0" y="281865"/>
+            <a:ext cx="6115838" cy="3350336"/>
+          </a:xfrm>
+          <a:prstGeom prst="rect">
+            <a:avLst/>
+          </a:prstGeom>
+        </p:spPr>
+      </p:pic>
+      <p:pic>
+        <p:nvPicPr>
+          <p:cNvPr id="4" name="Content Placeholder 3"/>
+          <p:cNvPicPr>
+            <a:picLocks noGrp="1" noChangeAspect="1"/>
+          </p:cNvPicPr>
+          <p:nvPr>
+            <p:ph idx="1"/>
+          </p:nvPr>
+        </p:nvPicPr>
+        <p:blipFill>
+          <a:blip r:embed="rId5">
+            <a:extLst>
+              <a:ext uri="{28A0092B-C50C-407E-A947-70E740481C1C}">
+                <a14:useLocalDpi xmlns:a14="http://schemas.microsoft.com/office/drawing/2010/main" val="0"/>
+              </a:ext>
+            </a:extLst>
+          </a:blip>
+          <a:stretch>
+            <a:fillRect/>
+          </a:stretch>
+        </p:blipFill>
+        <p:spPr>
+          <a:xfrm>
+            <a:off x="6152547" y="2916385"/>
+            <a:ext cx="6072919" cy="3267979"/>
+          </a:xfrm>
+        </p:spPr>
+      </p:pic>
+    </p:spTree>
+    <p:extLst>
+      <p:ext uri="{BB962C8B-B14F-4D97-AF65-F5344CB8AC3E}">
+        <p14:creationId xmlns:p14="http://schemas.microsoft.com/office/powerpoint/2010/main" val="2677100968"/>
+      </p:ext>
+    </p:extLst>
+  </p:cSld>
+  <p:clrMapOvr>
+    <a:masterClrMapping/>
+  </p:clrMapOvr>
+</p:sld>
+</file>
+
+<file path=ppt/slides/slide13.xml><?xml version="1.0" encoding="utf-8"?>
+<p:sld xmlns:a="http://schemas.openxmlformats.org/drawingml/2006/main" xmlns:r="http://schemas.openxmlformats.org/officeDocument/2006/relationships" xmlns:p="http://schemas.openxmlformats.org/presentationml/2006/main">
+  <p:cSld>
+    <p:spTree>
+      <p:nvGrpSpPr>
+        <p:cNvPr id="1" name=""/>
+        <p:cNvGrpSpPr/>
+        <p:nvPr/>
+      </p:nvGrpSpPr>
+      <p:grpSpPr>
+        <a:xfrm>
+          <a:off x="0" y="0"/>
+          <a:ext cx="0" cy="0"/>
+          <a:chOff x="0" y="0"/>
+          <a:chExt cx="0" cy="0"/>
+        </a:xfrm>
+      </p:grpSpPr>
+      <p:sp>
+        <p:nvSpPr>
+          <p:cNvPr id="2" name="Title 1"/>
+          <p:cNvSpPr>
+            <a:spLocks noGrp="1"/>
+          </p:cNvSpPr>
+          <p:nvPr>
+            <p:ph type="title"/>
+          </p:nvPr>
+        </p:nvSpPr>
+        <p:spPr/>
+        <p:txBody>
+          <a:bodyPr/>
+          <a:lstStyle/>
+          <a:p>
+            <a:endParaRPr lang="en-US"/>
+          </a:p>
+        </p:txBody>
+      </p:sp>
+      <p:pic>
+        <p:nvPicPr>
+          <p:cNvPr id="4" name="Content Placeholder 3"/>
+          <p:cNvPicPr>
+            <a:picLocks noGrp="1" noChangeAspect="1"/>
+          </p:cNvPicPr>
+          <p:nvPr>
+            <p:ph idx="1"/>
+          </p:nvPr>
+        </p:nvPicPr>
+        <p:blipFill>
+          <a:blip r:embed="rId2">
+            <a:extLst>
+              <a:ext uri="{28A0092B-C50C-407E-A947-70E740481C1C}">
+                <a14:useLocalDpi xmlns:a14="http://schemas.microsoft.com/office/drawing/2010/main" val="0"/>
+              </a:ext>
+            </a:extLst>
+          </a:blip>
+          <a:stretch>
+            <a:fillRect/>
+          </a:stretch>
+        </p:blipFill>
+        <p:spPr>
+          <a:xfrm>
+            <a:off x="0" y="1041400"/>
+            <a:ext cx="12125659" cy="5422900"/>
+          </a:xfrm>
+        </p:spPr>
+      </p:pic>
+    </p:spTree>
+    <p:extLst>
+      <p:ext uri="{BB962C8B-B14F-4D97-AF65-F5344CB8AC3E}">
+        <p14:creationId xmlns:p14="http://schemas.microsoft.com/office/powerpoint/2010/main" val="3591732803"/>
+      </p:ext>
+    </p:extLst>
+  </p:cSld>
+  <p:clrMapOvr>
+    <a:masterClrMapping/>
+  </p:clrMapOvr>
+</p:sld>
+</file>
+
+<file path=ppt/slides/slide14.xml><?xml version="1.0" encoding="utf-8"?>
+<p:sld xmlns:a="http://schemas.openxmlformats.org/drawingml/2006/main" xmlns:r="http://schemas.openxmlformats.org/officeDocument/2006/relationships" xmlns:p="http://schemas.openxmlformats.org/presentationml/2006/main">
+  <p:cSld>
+    <p:spTree>
+      <p:nvGrpSpPr>
+        <p:cNvPr id="1" name=""/>
+        <p:cNvGrpSpPr/>
+        <p:nvPr/>
+      </p:nvGrpSpPr>
+      <p:grpSpPr>
+        <a:xfrm>
+          <a:off x="0" y="0"/>
+          <a:ext cx="0" cy="0"/>
+          <a:chOff x="0" y="0"/>
+          <a:chExt cx="0" cy="0"/>
+        </a:xfrm>
+      </p:grpSpPr>
+      <p:sp>
+        <p:nvSpPr>
+          <p:cNvPr id="2" name="Title 1"/>
+          <p:cNvSpPr>
+            <a:spLocks noGrp="1"/>
+          </p:cNvSpPr>
+          <p:nvPr>
+            <p:ph type="title"/>
+          </p:nvPr>
+        </p:nvSpPr>
+        <p:spPr/>
+        <p:txBody>
+          <a:bodyPr/>
+          <a:lstStyle/>
+          <a:p>
+            <a:r>
+              <a:rPr lang="en-US" dirty="0" smtClean="0"/>
+              <a:t>Depression</a:t>
+            </a:r>
+            <a:r>
+              <a:rPr lang="en-US" dirty="0" smtClean="0"/>
+              <a:t>: Are we even going to have a game?</a:t>
             </a:r>
             <a:endParaRPr lang="en-US" dirty="0"/>
           </a:p>
@@ -3657,7 +4207,7 @@
 </p:sld>
 </file>
 
-<file path=ppt/slides/slide12.xml><?xml version="1.0" encoding="utf-8"?>
+<file path=ppt/slides/slide15.xml><?xml version="1.0" encoding="utf-8"?>
 <p:sld xmlns:a="http://schemas.openxmlformats.org/drawingml/2006/main" xmlns:r="http://schemas.openxmlformats.org/officeDocument/2006/relationships" xmlns:p="http://schemas.openxmlformats.org/presentationml/2006/main">
   <p:cSld>
     <p:spTree>
@@ -3970,7 +4520,7 @@
 </p:sld>
 </file>
 
-<file path=ppt/slides/slide13.xml><?xml version="1.0" encoding="utf-8"?>
+<file path=ppt/slides/slide16.xml><?xml version="1.0" encoding="utf-8"?>
 <p:sld xmlns:a="http://schemas.openxmlformats.org/drawingml/2006/main" xmlns:r="http://schemas.openxmlformats.org/officeDocument/2006/relationships" xmlns:p="http://schemas.openxmlformats.org/presentationml/2006/main">
   <p:cSld>
     <p:spTree>
@@ -4077,7 +4627,7 @@
 </p:sld>
 </file>
 
-<file path=ppt/slides/slide14.xml><?xml version="1.0" encoding="utf-8"?>
+<file path=ppt/slides/slide17.xml><?xml version="1.0" encoding="utf-8"?>
 <p:sld xmlns:a="http://schemas.openxmlformats.org/drawingml/2006/main" xmlns:r="http://schemas.openxmlformats.org/officeDocument/2006/relationships" xmlns:p="http://schemas.openxmlformats.org/presentationml/2006/main">
   <p:cSld>
     <p:spTree>
@@ -4192,7 +4742,428 @@
 </p:sld>
 </file>
 
-<file path=ppt/slides/slide15.xml><?xml version="1.0" encoding="utf-8"?>
+<file path=ppt/slides/slide18.xml><?xml version="1.0" encoding="utf-8"?>
+<p:sld xmlns:a="http://schemas.openxmlformats.org/drawingml/2006/main" xmlns:r="http://schemas.openxmlformats.org/officeDocument/2006/relationships" xmlns:p="http://schemas.openxmlformats.org/presentationml/2006/main">
+  <p:cSld>
+    <p:spTree>
+      <p:nvGrpSpPr>
+        <p:cNvPr id="1" name=""/>
+        <p:cNvGrpSpPr/>
+        <p:nvPr/>
+      </p:nvGrpSpPr>
+      <p:grpSpPr>
+        <a:xfrm>
+          <a:off x="0" y="0"/>
+          <a:ext cx="0" cy="0"/>
+          <a:chOff x="0" y="0"/>
+          <a:chExt cx="0" cy="0"/>
+        </a:xfrm>
+      </p:grpSpPr>
+      <p:sp>
+        <p:nvSpPr>
+          <p:cNvPr id="2" name="Title 1"/>
+          <p:cNvSpPr>
+            <a:spLocks noGrp="1"/>
+          </p:cNvSpPr>
+          <p:nvPr>
+            <p:ph type="title"/>
+          </p:nvPr>
+        </p:nvSpPr>
+        <p:spPr/>
+        <p:txBody>
+          <a:bodyPr/>
+          <a:lstStyle/>
+          <a:p>
+            <a:endParaRPr lang="en-US"/>
+          </a:p>
+        </p:txBody>
+      </p:sp>
+      <p:pic>
+        <p:nvPicPr>
+          <p:cNvPr id="4" name="Content Placeholder 3"/>
+          <p:cNvPicPr>
+            <a:picLocks noGrp="1" noChangeAspect="1"/>
+          </p:cNvPicPr>
+          <p:nvPr>
+            <p:ph idx="1"/>
+          </p:nvPr>
+        </p:nvPicPr>
+        <p:blipFill>
+          <a:blip r:embed="rId2">
+            <a:extLst>
+              <a:ext uri="{28A0092B-C50C-407E-A947-70E740481C1C}">
+                <a14:useLocalDpi xmlns:a14="http://schemas.microsoft.com/office/drawing/2010/main" val="0"/>
+              </a:ext>
+            </a:extLst>
+          </a:blip>
+          <a:stretch>
+            <a:fillRect/>
+          </a:stretch>
+        </p:blipFill>
+        <p:spPr>
+          <a:xfrm>
+            <a:off x="1465261" y="0"/>
+            <a:ext cx="9156700" cy="6867525"/>
+          </a:xfrm>
+        </p:spPr>
+      </p:pic>
+    </p:spTree>
+    <p:extLst>
+      <p:ext uri="{BB962C8B-B14F-4D97-AF65-F5344CB8AC3E}">
+        <p14:creationId xmlns:p14="http://schemas.microsoft.com/office/powerpoint/2010/main" val="3742682497"/>
+      </p:ext>
+    </p:extLst>
+  </p:cSld>
+  <p:clrMapOvr>
+    <a:masterClrMapping/>
+  </p:clrMapOvr>
+</p:sld>
+</file>
+
+<file path=ppt/slides/slide19.xml><?xml version="1.0" encoding="utf-8"?>
+<p:sld xmlns:a="http://schemas.openxmlformats.org/drawingml/2006/main" xmlns:r="http://schemas.openxmlformats.org/officeDocument/2006/relationships" xmlns:p="http://schemas.openxmlformats.org/presentationml/2006/main">
+  <p:cSld>
+    <p:spTree>
+      <p:nvGrpSpPr>
+        <p:cNvPr id="1" name=""/>
+        <p:cNvGrpSpPr/>
+        <p:nvPr/>
+      </p:nvGrpSpPr>
+      <p:grpSpPr>
+        <a:xfrm>
+          <a:off x="0" y="0"/>
+          <a:ext cx="0" cy="0"/>
+          <a:chOff x="0" y="0"/>
+          <a:chExt cx="0" cy="0"/>
+        </a:xfrm>
+      </p:grpSpPr>
+      <p:sp>
+        <p:nvSpPr>
+          <p:cNvPr id="2" name="Title 1"/>
+          <p:cNvSpPr>
+            <a:spLocks noGrp="1"/>
+          </p:cNvSpPr>
+          <p:nvPr>
+            <p:ph type="title"/>
+          </p:nvPr>
+        </p:nvSpPr>
+        <p:spPr/>
+        <p:txBody>
+          <a:bodyPr/>
+          <a:lstStyle/>
+          <a:p>
+            <a:endParaRPr lang="en-US"/>
+          </a:p>
+        </p:txBody>
+      </p:sp>
+      <p:pic>
+        <p:nvPicPr>
+          <p:cNvPr id="4" name="Content Placeholder 3"/>
+          <p:cNvPicPr>
+            <a:picLocks noGrp="1" noChangeAspect="1"/>
+          </p:cNvPicPr>
+          <p:nvPr>
+            <p:ph idx="1"/>
+          </p:nvPr>
+        </p:nvPicPr>
+        <p:blipFill>
+          <a:blip r:embed="rId2">
+            <a:extLst>
+              <a:ext uri="{28A0092B-C50C-407E-A947-70E740481C1C}">
+                <a14:useLocalDpi xmlns:a14="http://schemas.microsoft.com/office/drawing/2010/main" val="0"/>
+              </a:ext>
+            </a:extLst>
+          </a:blip>
+          <a:stretch>
+            <a:fillRect/>
+          </a:stretch>
+        </p:blipFill>
+        <p:spPr>
+          <a:xfrm>
+            <a:off x="1471611" y="0"/>
+            <a:ext cx="9144000" cy="6858000"/>
+          </a:xfrm>
+        </p:spPr>
+      </p:pic>
+    </p:spTree>
+    <p:extLst>
+      <p:ext uri="{BB962C8B-B14F-4D97-AF65-F5344CB8AC3E}">
+        <p14:creationId xmlns:p14="http://schemas.microsoft.com/office/powerpoint/2010/main" val="4152294815"/>
+      </p:ext>
+    </p:extLst>
+  </p:cSld>
+  <p:clrMapOvr>
+    <a:masterClrMapping/>
+  </p:clrMapOvr>
+</p:sld>
+</file>
+
+<file path=ppt/slides/slide2.xml><?xml version="1.0" encoding="utf-8"?>
+<p:sld xmlns:a="http://schemas.openxmlformats.org/drawingml/2006/main" xmlns:r="http://schemas.openxmlformats.org/officeDocument/2006/relationships" xmlns:p="http://schemas.openxmlformats.org/presentationml/2006/main">
+  <p:cSld>
+    <p:spTree>
+      <p:nvGrpSpPr>
+        <p:cNvPr id="1" name=""/>
+        <p:cNvGrpSpPr/>
+        <p:nvPr/>
+      </p:nvGrpSpPr>
+      <p:grpSpPr>
+        <a:xfrm>
+          <a:off x="0" y="0"/>
+          <a:ext cx="0" cy="0"/>
+          <a:chOff x="0" y="0"/>
+          <a:chExt cx="0" cy="0"/>
+        </a:xfrm>
+      </p:grpSpPr>
+      <p:sp>
+        <p:nvSpPr>
+          <p:cNvPr id="2" name="Title 1"/>
+          <p:cNvSpPr>
+            <a:spLocks noGrp="1"/>
+          </p:cNvSpPr>
+          <p:nvPr>
+            <p:ph type="title"/>
+          </p:nvPr>
+        </p:nvSpPr>
+        <p:spPr/>
+        <p:txBody>
+          <a:bodyPr/>
+          <a:lstStyle/>
+          <a:p>
+            <a:r>
+              <a:rPr lang="en-US" dirty="0" smtClean="0"/>
+              <a:t>Vision</a:t>
+            </a:r>
+            <a:endParaRPr lang="en-US" dirty="0"/>
+          </a:p>
+        </p:txBody>
+      </p:sp>
+      <p:sp>
+        <p:nvSpPr>
+          <p:cNvPr id="3" name="Content Placeholder 2"/>
+          <p:cNvSpPr>
+            <a:spLocks noGrp="1"/>
+          </p:cNvSpPr>
+          <p:nvPr>
+            <p:ph idx="1"/>
+          </p:nvPr>
+        </p:nvSpPr>
+        <p:spPr/>
+        <p:txBody>
+          <a:bodyPr/>
+          <a:lstStyle/>
+          <a:p>
+            <a:r>
+              <a:rPr lang="en-US" dirty="0" smtClean="0"/>
+              <a:t>From the HLDD: “The </a:t>
+            </a:r>
+            <a:r>
+              <a:rPr lang="en-US" dirty="0"/>
+              <a:t>core idea of this game is a system that a player can never fully explore. We want them to feel like there’s always a new idea to come up with</a:t>
+            </a:r>
+            <a:r>
+              <a:rPr lang="en-US" dirty="0" smtClean="0"/>
+              <a:t>.”</a:t>
+            </a:r>
+          </a:p>
+          <a:p>
+            <a:endParaRPr lang="en-US" dirty="0"/>
+          </a:p>
+          <a:p>
+            <a:r>
+              <a:rPr lang="en-US" dirty="0" smtClean="0"/>
+              <a:t>A procedurally parsed magic system that a player could learn about</a:t>
+            </a:r>
+          </a:p>
+          <a:p>
+            <a:endParaRPr lang="en-US" dirty="0"/>
+          </a:p>
+          <a:p>
+            <a:r>
+              <a:rPr lang="en-US" dirty="0" smtClean="0"/>
+              <a:t>A world that a player could meaningfully interact with</a:t>
+            </a:r>
+            <a:endParaRPr lang="en-US" dirty="0"/>
+          </a:p>
+        </p:txBody>
+      </p:sp>
+    </p:spTree>
+    <p:extLst>
+      <p:ext uri="{BB962C8B-B14F-4D97-AF65-F5344CB8AC3E}">
+        <p14:creationId xmlns:p14="http://schemas.microsoft.com/office/powerpoint/2010/main" val="1322072325"/>
+      </p:ext>
+    </p:extLst>
+  </p:cSld>
+  <p:clrMapOvr>
+    <a:masterClrMapping/>
+  </p:clrMapOvr>
+  <p:timing>
+    <p:tnLst>
+      <p:par>
+        <p:cTn id="1" dur="indefinite" restart="never" nodeType="tmRoot"/>
+      </p:par>
+    </p:tnLst>
+  </p:timing>
+</p:sld>
+</file>
+
+<file path=ppt/slides/slide20.xml><?xml version="1.0" encoding="utf-8"?>
+<p:sld xmlns:a="http://schemas.openxmlformats.org/drawingml/2006/main" xmlns:r="http://schemas.openxmlformats.org/officeDocument/2006/relationships" xmlns:p="http://schemas.openxmlformats.org/presentationml/2006/main">
+  <p:cSld>
+    <p:spTree>
+      <p:nvGrpSpPr>
+        <p:cNvPr id="1" name=""/>
+        <p:cNvGrpSpPr/>
+        <p:nvPr/>
+      </p:nvGrpSpPr>
+      <p:grpSpPr>
+        <a:xfrm>
+          <a:off x="0" y="0"/>
+          <a:ext cx="0" cy="0"/>
+          <a:chOff x="0" y="0"/>
+          <a:chExt cx="0" cy="0"/>
+        </a:xfrm>
+      </p:grpSpPr>
+      <p:sp>
+        <p:nvSpPr>
+          <p:cNvPr id="2" name="Title 1"/>
+          <p:cNvSpPr>
+            <a:spLocks noGrp="1"/>
+          </p:cNvSpPr>
+          <p:nvPr>
+            <p:ph type="title"/>
+          </p:nvPr>
+        </p:nvSpPr>
+        <p:spPr/>
+        <p:txBody>
+          <a:bodyPr/>
+          <a:lstStyle/>
+          <a:p>
+            <a:endParaRPr lang="en-US"/>
+          </a:p>
+        </p:txBody>
+      </p:sp>
+      <p:pic>
+        <p:nvPicPr>
+          <p:cNvPr id="4" name="Content Placeholder 3"/>
+          <p:cNvPicPr>
+            <a:picLocks noGrp="1" noChangeAspect="1"/>
+          </p:cNvPicPr>
+          <p:nvPr>
+            <p:ph idx="1"/>
+          </p:nvPr>
+        </p:nvPicPr>
+        <p:blipFill>
+          <a:blip r:embed="rId2">
+            <a:extLst>
+              <a:ext uri="{28A0092B-C50C-407E-A947-70E740481C1C}">
+                <a14:useLocalDpi xmlns:a14="http://schemas.microsoft.com/office/drawing/2010/main" val="0"/>
+              </a:ext>
+            </a:extLst>
+          </a:blip>
+          <a:stretch>
+            <a:fillRect/>
+          </a:stretch>
+        </p:blipFill>
+        <p:spPr>
+          <a:xfrm>
+            <a:off x="1471611" y="0"/>
+            <a:ext cx="9143999" cy="6858000"/>
+          </a:xfrm>
+        </p:spPr>
+      </p:pic>
+    </p:spTree>
+    <p:extLst>
+      <p:ext uri="{BB962C8B-B14F-4D97-AF65-F5344CB8AC3E}">
+        <p14:creationId xmlns:p14="http://schemas.microsoft.com/office/powerpoint/2010/main" val="934339108"/>
+      </p:ext>
+    </p:extLst>
+  </p:cSld>
+  <p:clrMapOvr>
+    <a:masterClrMapping/>
+  </p:clrMapOvr>
+</p:sld>
+</file>
+
+<file path=ppt/slides/slide21.xml><?xml version="1.0" encoding="utf-8"?>
+<p:sld xmlns:a="http://schemas.openxmlformats.org/drawingml/2006/main" xmlns:r="http://schemas.openxmlformats.org/officeDocument/2006/relationships" xmlns:p="http://schemas.openxmlformats.org/presentationml/2006/main">
+  <p:cSld>
+    <p:spTree>
+      <p:nvGrpSpPr>
+        <p:cNvPr id="1" name=""/>
+        <p:cNvGrpSpPr/>
+        <p:nvPr/>
+      </p:nvGrpSpPr>
+      <p:grpSpPr>
+        <a:xfrm>
+          <a:off x="0" y="0"/>
+          <a:ext cx="0" cy="0"/>
+          <a:chOff x="0" y="0"/>
+          <a:chExt cx="0" cy="0"/>
+        </a:xfrm>
+      </p:grpSpPr>
+      <p:sp>
+        <p:nvSpPr>
+          <p:cNvPr id="2" name="Title 1"/>
+          <p:cNvSpPr>
+            <a:spLocks noGrp="1"/>
+          </p:cNvSpPr>
+          <p:nvPr>
+            <p:ph type="title"/>
+          </p:nvPr>
+        </p:nvSpPr>
+        <p:spPr/>
+        <p:txBody>
+          <a:bodyPr/>
+          <a:lstStyle/>
+          <a:p>
+            <a:endParaRPr lang="en-US"/>
+          </a:p>
+        </p:txBody>
+      </p:sp>
+      <p:pic>
+        <p:nvPicPr>
+          <p:cNvPr id="4" name="Content Placeholder 3"/>
+          <p:cNvPicPr>
+            <a:picLocks noGrp="1" noChangeAspect="1"/>
+          </p:cNvPicPr>
+          <p:nvPr>
+            <p:ph idx="1"/>
+          </p:nvPr>
+        </p:nvPicPr>
+        <p:blipFill>
+          <a:blip r:embed="rId2">
+            <a:extLst>
+              <a:ext uri="{28A0092B-C50C-407E-A947-70E740481C1C}">
+                <a14:useLocalDpi xmlns:a14="http://schemas.microsoft.com/office/drawing/2010/main" val="0"/>
+              </a:ext>
+            </a:extLst>
+          </a:blip>
+          <a:stretch>
+            <a:fillRect/>
+          </a:stretch>
+        </p:blipFill>
+        <p:spPr>
+          <a:xfrm>
+            <a:off x="1471611" y="0"/>
+            <a:ext cx="9143999" cy="6858000"/>
+          </a:xfrm>
+        </p:spPr>
+      </p:pic>
+    </p:spTree>
+    <p:extLst>
+      <p:ext uri="{BB962C8B-B14F-4D97-AF65-F5344CB8AC3E}">
+        <p14:creationId xmlns:p14="http://schemas.microsoft.com/office/powerpoint/2010/main" val="438523699"/>
+      </p:ext>
+    </p:extLst>
+  </p:cSld>
+  <p:clrMapOvr>
+    <a:masterClrMapping/>
+  </p:clrMapOvr>
+</p:sld>
+</file>
+
+<file path=ppt/slides/slide22.xml><?xml version="1.0" encoding="utf-8"?>
 <p:sld xmlns:a="http://schemas.openxmlformats.org/drawingml/2006/main" xmlns:r="http://schemas.openxmlformats.org/officeDocument/2006/relationships" xmlns:p="http://schemas.openxmlformats.org/presentationml/2006/main">
   <p:cSld>
     <p:spTree>
@@ -4290,7 +5261,7 @@
 </p:sld>
 </file>
 
-<file path=ppt/slides/slide16.xml><?xml version="1.0" encoding="utf-8"?>
+<file path=ppt/slides/slide23.xml><?xml version="1.0" encoding="utf-8"?>
 <p:sld xmlns:a="http://schemas.openxmlformats.org/drawingml/2006/main" xmlns:r="http://schemas.openxmlformats.org/officeDocument/2006/relationships" xmlns:p="http://schemas.openxmlformats.org/presentationml/2006/main">
   <p:cSld>
     <p:spTree>
@@ -4421,115 +5392,6 @@
     <p:extLst>
       <p:ext uri="{BB962C8B-B14F-4D97-AF65-F5344CB8AC3E}">
         <p14:creationId xmlns:p14="http://schemas.microsoft.com/office/powerpoint/2010/main" val="2984762766"/>
-      </p:ext>
-    </p:extLst>
-  </p:cSld>
-  <p:clrMapOvr>
-    <a:masterClrMapping/>
-  </p:clrMapOvr>
-  <p:timing>
-    <p:tnLst>
-      <p:par>
-        <p:cTn id="1" dur="indefinite" restart="never" nodeType="tmRoot"/>
-      </p:par>
-    </p:tnLst>
-  </p:timing>
-</p:sld>
-</file>
-
-<file path=ppt/slides/slide2.xml><?xml version="1.0" encoding="utf-8"?>
-<p:sld xmlns:a="http://schemas.openxmlformats.org/drawingml/2006/main" xmlns:r="http://schemas.openxmlformats.org/officeDocument/2006/relationships" xmlns:p="http://schemas.openxmlformats.org/presentationml/2006/main">
-  <p:cSld>
-    <p:spTree>
-      <p:nvGrpSpPr>
-        <p:cNvPr id="1" name=""/>
-        <p:cNvGrpSpPr/>
-        <p:nvPr/>
-      </p:nvGrpSpPr>
-      <p:grpSpPr>
-        <a:xfrm>
-          <a:off x="0" y="0"/>
-          <a:ext cx="0" cy="0"/>
-          <a:chOff x="0" y="0"/>
-          <a:chExt cx="0" cy="0"/>
-        </a:xfrm>
-      </p:grpSpPr>
-      <p:sp>
-        <p:nvSpPr>
-          <p:cNvPr id="2" name="Title 1"/>
-          <p:cNvSpPr>
-            <a:spLocks noGrp="1"/>
-          </p:cNvSpPr>
-          <p:nvPr>
-            <p:ph type="title"/>
-          </p:nvPr>
-        </p:nvSpPr>
-        <p:spPr/>
-        <p:txBody>
-          <a:bodyPr/>
-          <a:lstStyle/>
-          <a:p>
-            <a:r>
-              <a:rPr lang="en-US" dirty="0" smtClean="0"/>
-              <a:t>Vision</a:t>
-            </a:r>
-            <a:endParaRPr lang="en-US" dirty="0"/>
-          </a:p>
-        </p:txBody>
-      </p:sp>
-      <p:sp>
-        <p:nvSpPr>
-          <p:cNvPr id="3" name="Content Placeholder 2"/>
-          <p:cNvSpPr>
-            <a:spLocks noGrp="1"/>
-          </p:cNvSpPr>
-          <p:nvPr>
-            <p:ph idx="1"/>
-          </p:nvPr>
-        </p:nvSpPr>
-        <p:spPr/>
-        <p:txBody>
-          <a:bodyPr/>
-          <a:lstStyle/>
-          <a:p>
-            <a:r>
-              <a:rPr lang="en-US" dirty="0" smtClean="0"/>
-              <a:t>From the HLDD: “The </a:t>
-            </a:r>
-            <a:r>
-              <a:rPr lang="en-US" dirty="0"/>
-              <a:t>core idea of this game is a system that a player can never fully explore. We want them to feel like there’s always a new idea to come up with</a:t>
-            </a:r>
-            <a:r>
-              <a:rPr lang="en-US" dirty="0" smtClean="0"/>
-              <a:t>.”</a:t>
-            </a:r>
-          </a:p>
-          <a:p>
-            <a:endParaRPr lang="en-US" dirty="0"/>
-          </a:p>
-          <a:p>
-            <a:r>
-              <a:rPr lang="en-US" dirty="0" smtClean="0"/>
-              <a:t>A procedurally parsed magic system that a player could learn about</a:t>
-            </a:r>
-          </a:p>
-          <a:p>
-            <a:endParaRPr lang="en-US" dirty="0"/>
-          </a:p>
-          <a:p>
-            <a:r>
-              <a:rPr lang="en-US" dirty="0" smtClean="0"/>
-              <a:t>A world that a player could meaningfully interact with</a:t>
-            </a:r>
-            <a:endParaRPr lang="en-US" dirty="0"/>
-          </a:p>
-        </p:txBody>
-      </p:sp>
-    </p:spTree>
-    <p:extLst>
-      <p:ext uri="{BB962C8B-B14F-4D97-AF65-F5344CB8AC3E}">
-        <p14:creationId xmlns:p14="http://schemas.microsoft.com/office/powerpoint/2010/main" val="1322072325"/>
       </p:ext>
     </p:extLst>
   </p:cSld>
@@ -4792,8 +5654,13 @@
           <a:p>
             <a:r>
               <a:rPr lang="en-US" dirty="0" smtClean="0"/>
-              <a:t>Insistence that we had more time</a:t>
-            </a:r>
+              <a:t>Insistence that </a:t>
+            </a:r>
+            <a:r>
+              <a:rPr lang="en-US" dirty="0" smtClean="0"/>
+              <a:t>could do more than we could</a:t>
+            </a:r>
+            <a:endParaRPr lang="en-US" dirty="0" smtClean="0"/>
           </a:p>
           <a:p>
             <a:endParaRPr lang="en-US" dirty="0" smtClean="0"/>
@@ -4915,19 +5782,13 @@
             </a:r>
             <a:r>
               <a:rPr lang="en-US" dirty="0" smtClean="0"/>
-              <a:t>time 		 #</a:t>
-            </a:r>
-            <a:r>
-              <a:rPr lang="en-US" dirty="0" err="1" smtClean="0"/>
-              <a:t>MITArtSchool</a:t>
-            </a:r>
-            <a:endParaRPr lang="en-US" dirty="0"/>
-          </a:p>
-          <a:p>
-            <a:r>
-              <a:rPr lang="en-US" dirty="0" smtClean="0"/>
-              <a:t> </a:t>
-            </a:r>
+              <a:t>time </a:t>
+            </a:r>
+            <a:endParaRPr lang="en-US" dirty="0"/>
+          </a:p>
+          <a:p>
+            <a:pPr lvl="2"/>
+            <a:endParaRPr lang="en-US" dirty="0" smtClean="0"/>
           </a:p>
           <a:p>
             <a:r>
@@ -4947,196 +5808,6 @@
           </a:p>
         </p:txBody>
       </p:sp>
-      <p:sp>
-        <p:nvSpPr>
-          <p:cNvPr id="4" name="Oval 3"/>
-          <p:cNvSpPr/>
-          <p:nvPr/>
-        </p:nvSpPr>
-        <p:spPr>
-          <a:xfrm>
-            <a:off x="5883215" y="3735238"/>
-            <a:ext cx="198408" cy="198408"/>
-          </a:xfrm>
-          <a:prstGeom prst="ellipse">
-            <a:avLst/>
-          </a:prstGeom>
-        </p:spPr>
-        <p:style>
-          <a:lnRef idx="2">
-            <a:schemeClr val="dk1">
-              <a:shade val="50000"/>
-            </a:schemeClr>
-          </a:lnRef>
-          <a:fillRef idx="1">
-            <a:schemeClr val="dk1"/>
-          </a:fillRef>
-          <a:effectRef idx="0">
-            <a:schemeClr val="dk1"/>
-          </a:effectRef>
-          <a:fontRef idx="minor">
-            <a:schemeClr val="lt1"/>
-          </a:fontRef>
-        </p:style>
-        <p:txBody>
-          <a:bodyPr rtlCol="0" anchor="ctr"/>
-          <a:lstStyle/>
-          <a:p>
-            <a:pPr algn="ctr"/>
-            <a:endParaRPr lang="en-US"/>
-          </a:p>
-        </p:txBody>
-      </p:sp>
-      <p:cxnSp>
-        <p:nvCxnSpPr>
-          <p:cNvPr id="6" name="Straight Connector 5"/>
-          <p:cNvCxnSpPr/>
-          <p:nvPr/>
-        </p:nvCxnSpPr>
-        <p:spPr>
-          <a:xfrm>
-            <a:off x="5978105" y="3933646"/>
-            <a:ext cx="0" cy="172528"/>
-          </a:xfrm>
-          <a:prstGeom prst="line">
-            <a:avLst/>
-          </a:prstGeom>
-        </p:spPr>
-        <p:style>
-          <a:lnRef idx="1">
-            <a:schemeClr val="dk1"/>
-          </a:lnRef>
-          <a:fillRef idx="0">
-            <a:schemeClr val="dk1"/>
-          </a:fillRef>
-          <a:effectRef idx="0">
-            <a:schemeClr val="dk1"/>
-          </a:effectRef>
-          <a:fontRef idx="minor">
-            <a:schemeClr val="tx1"/>
-          </a:fontRef>
-        </p:style>
-      </p:cxnSp>
-      <p:cxnSp>
-        <p:nvCxnSpPr>
-          <p:cNvPr id="9" name="Straight Connector 8"/>
-          <p:cNvCxnSpPr/>
-          <p:nvPr/>
-        </p:nvCxnSpPr>
-        <p:spPr>
-          <a:xfrm>
-            <a:off x="5978106" y="4114800"/>
-            <a:ext cx="103517" cy="103517"/>
-          </a:xfrm>
-          <a:prstGeom prst="line">
-            <a:avLst/>
-          </a:prstGeom>
-        </p:spPr>
-        <p:style>
-          <a:lnRef idx="1">
-            <a:schemeClr val="dk1"/>
-          </a:lnRef>
-          <a:fillRef idx="0">
-            <a:schemeClr val="dk1"/>
-          </a:fillRef>
-          <a:effectRef idx="0">
-            <a:schemeClr val="dk1"/>
-          </a:effectRef>
-          <a:fontRef idx="minor">
-            <a:schemeClr val="tx1"/>
-          </a:fontRef>
-        </p:style>
-      </p:cxnSp>
-      <p:cxnSp>
-        <p:nvCxnSpPr>
-          <p:cNvPr id="10" name="Straight Connector 9"/>
-          <p:cNvCxnSpPr/>
-          <p:nvPr/>
-        </p:nvCxnSpPr>
-        <p:spPr>
-          <a:xfrm flipH="1">
-            <a:off x="5883215" y="4123426"/>
-            <a:ext cx="94891" cy="94891"/>
-          </a:xfrm>
-          <a:prstGeom prst="line">
-            <a:avLst/>
-          </a:prstGeom>
-        </p:spPr>
-        <p:style>
-          <a:lnRef idx="1">
-            <a:schemeClr val="dk1"/>
-          </a:lnRef>
-          <a:fillRef idx="0">
-            <a:schemeClr val="dk1"/>
-          </a:fillRef>
-          <a:effectRef idx="0">
-            <a:schemeClr val="dk1"/>
-          </a:effectRef>
-          <a:fontRef idx="minor">
-            <a:schemeClr val="tx1"/>
-          </a:fontRef>
-        </p:style>
-      </p:cxnSp>
-      <p:cxnSp>
-        <p:nvCxnSpPr>
-          <p:cNvPr id="12" name="Straight Connector 11"/>
-          <p:cNvCxnSpPr/>
-          <p:nvPr/>
-        </p:nvCxnSpPr>
-        <p:spPr>
-          <a:xfrm>
-            <a:off x="5978105" y="3942272"/>
-            <a:ext cx="103517" cy="103517"/>
-          </a:xfrm>
-          <a:prstGeom prst="line">
-            <a:avLst/>
-          </a:prstGeom>
-        </p:spPr>
-        <p:style>
-          <a:lnRef idx="1">
-            <a:schemeClr val="dk1"/>
-          </a:lnRef>
-          <a:fillRef idx="0">
-            <a:schemeClr val="dk1"/>
-          </a:fillRef>
-          <a:effectRef idx="0">
-            <a:schemeClr val="dk1"/>
-          </a:effectRef>
-          <a:fontRef idx="minor">
-            <a:schemeClr val="tx1"/>
-          </a:fontRef>
-        </p:style>
-      </p:cxnSp>
-      <p:cxnSp>
-        <p:nvCxnSpPr>
-          <p:cNvPr id="13" name="Straight Connector 12"/>
-          <p:cNvCxnSpPr/>
-          <p:nvPr/>
-        </p:nvCxnSpPr>
-        <p:spPr>
-          <a:xfrm flipH="1">
-            <a:off x="5883214" y="3950898"/>
-            <a:ext cx="94891" cy="94891"/>
-          </a:xfrm>
-          <a:prstGeom prst="line">
-            <a:avLst/>
-          </a:prstGeom>
-        </p:spPr>
-        <p:style>
-          <a:lnRef idx="1">
-            <a:schemeClr val="dk1"/>
-          </a:lnRef>
-          <a:fillRef idx="0">
-            <a:schemeClr val="dk1"/>
-          </a:fillRef>
-          <a:effectRef idx="0">
-            <a:schemeClr val="dk1"/>
-          </a:effectRef>
-          <a:fontRef idx="minor">
-            <a:schemeClr val="tx1"/>
-          </a:fontRef>
-        </p:style>
-      </p:cxnSp>
     </p:spTree>
     <p:extLst>
       <p:ext uri="{BB962C8B-B14F-4D97-AF65-F5344CB8AC3E}">
@@ -5240,41 +5911,12 @@
           <a:p>
             <a:r>
               <a:rPr lang="en-US" dirty="0" smtClean="0"/>
-              <a:t>ALL I WANTED WERE SOME FREAKING LIBRARIES WITH SOME FREAKING GUIs IN THEIR FREAKING HEADS</a:t>
-            </a:r>
-          </a:p>
-        </p:txBody>
-      </p:sp>
-      <p:pic>
-        <p:nvPicPr>
-          <p:cNvPr id="4" name="Picture 3"/>
-          <p:cNvPicPr>
-            <a:picLocks noChangeAspect="1"/>
-          </p:cNvPicPr>
-          <p:nvPr/>
-        </p:nvPicPr>
-        <p:blipFill>
-          <a:blip r:embed="rId2">
-            <a:extLst>
-              <a:ext uri="{28A0092B-C50C-407E-A947-70E740481C1C}">
-                <a14:useLocalDpi xmlns:a14="http://schemas.microsoft.com/office/drawing/2010/main" val="0"/>
-              </a:ext>
-            </a:extLst>
-          </a:blip>
-          <a:stretch>
-            <a:fillRect/>
-          </a:stretch>
-        </p:blipFill>
-        <p:spPr>
-          <a:xfrm>
-            <a:off x="9264769" y="4710023"/>
-            <a:ext cx="1587565" cy="1964612"/>
-          </a:xfrm>
-          <a:prstGeom prst="rect">
-            <a:avLst/>
-          </a:prstGeom>
-        </p:spPr>
-      </p:pic>
+              <a:t>Learning new libraries takes time</a:t>
+            </a:r>
+            <a:endParaRPr lang="en-US" dirty="0" smtClean="0"/>
+          </a:p>
+        </p:txBody>
+      </p:sp>
     </p:spTree>
     <p:extLst>
       <p:ext uri="{BB962C8B-B14F-4D97-AF65-F5344CB8AC3E}">

</xml_diff>

<commit_message>
changed a couple of things
</commit_message>
<xml_diff>
--- a/Final presentation slides.pptx
+++ b/Final presentation slides.pptx
@@ -335,7 +335,7 @@
             <a:fld id="{5586B75A-687E-405C-8A0B-8D00578BA2C3}" type="datetimeFigureOut">
               <a:rPr lang="en-US" dirty="0"/>
               <a:pPr/>
-              <a:t>5/14/2014</a:t>
+              <a:t>5/15/2014</a:t>
             </a:fld>
             <a:endParaRPr lang="en-US" dirty="0"/>
           </a:p>
@@ -521,7 +521,7 @@
           <a:p>
             <a:fld id="{5F4E5243-F52A-4D37-9694-EB26C6C31910}" type="datetimeFigureOut">
               <a:rPr lang="en-US" dirty="0"/>
-              <a:t>5/14/2014</a:t>
+              <a:t>5/15/2014</a:t>
             </a:fld>
             <a:endParaRPr lang="en-US" dirty="0"/>
           </a:p>
@@ -696,7 +696,7 @@
           <a:p>
             <a:fld id="{3A77B6E1-634A-48DC-9E8B-D894023267EF}" type="datetimeFigureOut">
               <a:rPr lang="en-US" dirty="0"/>
-              <a:t>5/14/2014</a:t>
+              <a:t>5/15/2014</a:t>
             </a:fld>
             <a:endParaRPr lang="en-US" dirty="0"/>
           </a:p>
@@ -861,7 +861,7 @@
           <a:p>
             <a:fld id="{7B2D3E9E-A95C-48F2-B4BF-A71542E0BE9A}" type="datetimeFigureOut">
               <a:rPr lang="en-US" dirty="0"/>
-              <a:t>5/14/2014</a:t>
+              <a:t>5/15/2014</a:t>
             </a:fld>
             <a:endParaRPr lang="en-US" dirty="0"/>
           </a:p>
@@ -1113,7 +1113,7 @@
             <a:fld id="{5586B75A-687E-405C-8A0B-8D00578BA2C3}" type="datetimeFigureOut">
               <a:rPr lang="en-US" dirty="0"/>
               <a:pPr/>
-              <a:t>5/14/2014</a:t>
+              <a:t>5/15/2014</a:t>
             </a:fld>
             <a:endParaRPr lang="en-US" dirty="0"/>
           </a:p>
@@ -1397,7 +1397,7 @@
           <a:p>
             <a:fld id="{F12952B5-7A2F-4CC8-B7CE-9234E21C2837}" type="datetimeFigureOut">
               <a:rPr lang="en-US" dirty="0"/>
-              <a:t>5/14/2014</a:t>
+              <a:t>5/15/2014</a:t>
             </a:fld>
             <a:endParaRPr lang="en-US" dirty="0"/>
           </a:p>
@@ -1830,7 +1830,7 @@
           <a:p>
             <a:fld id="{CE1DA07A-9201-4B4B-BAF2-015AFA30F520}" type="datetimeFigureOut">
               <a:rPr lang="en-US" dirty="0"/>
-              <a:t>5/14/2014</a:t>
+              <a:t>5/15/2014</a:t>
             </a:fld>
             <a:endParaRPr lang="en-US" dirty="0"/>
           </a:p>
@@ -1943,7 +1943,7 @@
           <a:p>
             <a:fld id="{73D7E00A-486F-4252-8B1D-E32645521F49}" type="datetimeFigureOut">
               <a:rPr lang="en-US" dirty="0"/>
-              <a:t>5/14/2014</a:t>
+              <a:t>5/15/2014</a:t>
             </a:fld>
             <a:endParaRPr lang="en-US" dirty="0"/>
           </a:p>
@@ -2033,7 +2033,7 @@
           <a:p>
             <a:fld id="{8DDF5F92-E675-4B36-9A60-69A962A68675}" type="datetimeFigureOut">
               <a:rPr lang="en-US" dirty="0"/>
-              <a:t>5/14/2014</a:t>
+              <a:t>5/15/2014</a:t>
             </a:fld>
             <a:endParaRPr lang="en-US" dirty="0"/>
           </a:p>
@@ -2384,7 +2384,7 @@
           <a:p>
             <a:fld id="{AF6E2C9B-5FA2-460D-9BE7-B0812FC2A6FF}" type="datetimeFigureOut">
               <a:rPr lang="en-US" dirty="0"/>
-              <a:t>5/14/2014</a:t>
+              <a:t>5/15/2014</a:t>
             </a:fld>
             <a:endParaRPr lang="en-US" dirty="0"/>
           </a:p>
@@ -2697,7 +2697,7 @@
             <a:fld id="{5586B75A-687E-405C-8A0B-8D00578BA2C3}" type="datetimeFigureOut">
               <a:rPr lang="en-US" dirty="0"/>
               <a:pPr/>
-              <a:t>5/14/2014</a:t>
+              <a:t>5/15/2014</a:t>
             </a:fld>
             <a:endParaRPr lang="en-US" dirty="0"/>
           </a:p>
@@ -2927,7 +2927,7 @@
             <a:fld id="{5586B75A-687E-405C-8A0B-8D00578BA2C3}" type="datetimeFigureOut">
               <a:rPr lang="en-US" dirty="0"/>
               <a:pPr/>
-              <a:t>5/14/2014</a:t>
+              <a:t>5/15/2014</a:t>
             </a:fld>
             <a:endParaRPr lang="en-US" dirty="0"/>
           </a:p>
@@ -3846,6 +3846,13 @@
   <p:clrMapOvr>
     <a:masterClrMapping/>
   </p:clrMapOvr>
+  <p:timing>
+    <p:tnLst>
+      <p:par>
+        <p:cTn id="1" dur="indefinite" restart="never" nodeType="tmRoot"/>
+      </p:par>
+    </p:tnLst>
+  </p:timing>
 </p:sld>
 </file>
 
@@ -4014,6 +4021,13 @@
   <p:clrMapOvr>
     <a:masterClrMapping/>
   </p:clrMapOvr>
+  <p:timing>
+    <p:tnLst>
+      <p:par>
+        <p:cTn id="1" dur="indefinite" restart="never" nodeType="tmRoot"/>
+      </p:par>
+    </p:tnLst>
+  </p:timing>
 </p:sld>
 </file>
 
@@ -4092,6 +4106,13 @@
   <p:clrMapOvr>
     <a:masterClrMapping/>
   </p:clrMapOvr>
+  <p:timing>
+    <p:tnLst>
+      <p:par>
+        <p:cTn id="1" dur="indefinite" restart="never" nodeType="tmRoot"/>
+      </p:par>
+    </p:tnLst>
+  </p:timing>
 </p:sld>
 </file>
 
@@ -4129,11 +4150,7 @@
           <a:p>
             <a:r>
               <a:rPr lang="en-US" dirty="0" smtClean="0"/>
-              <a:t>Depression</a:t>
-            </a:r>
-            <a:r>
-              <a:rPr lang="en-US" dirty="0" smtClean="0"/>
-              <a:t>: Are we even going to have a game?</a:t>
+              <a:t>Depression: Are we even going to have a game?</a:t>
             </a:r>
             <a:endParaRPr lang="en-US" dirty="0"/>
           </a:p>
@@ -4817,6 +4834,13 @@
   <p:clrMapOvr>
     <a:masterClrMapping/>
   </p:clrMapOvr>
+  <p:timing>
+    <p:tnLst>
+      <p:par>
+        <p:cTn id="1" dur="indefinite" restart="never" nodeType="tmRoot"/>
+      </p:par>
+    </p:tnLst>
+  </p:timing>
 </p:sld>
 </file>
 
@@ -4895,6 +4919,13 @@
   <p:clrMapOvr>
     <a:masterClrMapping/>
   </p:clrMapOvr>
+  <p:timing>
+    <p:tnLst>
+      <p:par>
+        <p:cTn id="1" dur="indefinite" restart="never" nodeType="tmRoot"/>
+      </p:par>
+    </p:tnLst>
+  </p:timing>
 </p:sld>
 </file>
 
@@ -5082,6 +5113,13 @@
   <p:clrMapOvr>
     <a:masterClrMapping/>
   </p:clrMapOvr>
+  <p:timing>
+    <p:tnLst>
+      <p:par>
+        <p:cTn id="1" dur="indefinite" restart="never" nodeType="tmRoot"/>
+      </p:par>
+    </p:tnLst>
+  </p:timing>
 </p:sld>
 </file>
 
@@ -5160,6 +5198,13 @@
   <p:clrMapOvr>
     <a:masterClrMapping/>
   </p:clrMapOvr>
+  <p:timing>
+    <p:tnLst>
+      <p:par>
+        <p:cTn id="1" dur="indefinite" restart="never" nodeType="tmRoot"/>
+      </p:par>
+    </p:tnLst>
+  </p:timing>
 </p:sld>
 </file>
 
@@ -5654,13 +5699,8 @@
           <a:p>
             <a:r>
               <a:rPr lang="en-US" dirty="0" smtClean="0"/>
-              <a:t>Insistence that </a:t>
-            </a:r>
-            <a:r>
-              <a:rPr lang="en-US" dirty="0" smtClean="0"/>
-              <a:t>could do more than we could</a:t>
-            </a:r>
-            <a:endParaRPr lang="en-US" dirty="0" smtClean="0"/>
+              <a:t>Insistence that could do more than we could</a:t>
+            </a:r>
           </a:p>
           <a:p>
             <a:endParaRPr lang="en-US" dirty="0" smtClean="0"/>
@@ -5890,13 +5930,6 @@
             <a:endParaRPr lang="en-US" dirty="0"/>
           </a:p>
           <a:p>
-            <a:pPr lvl="2"/>
-            <a:r>
-              <a:rPr lang="en-US" dirty="0" smtClean="0"/>
-              <a:t>Turns out producers are a thing</a:t>
-            </a:r>
-          </a:p>
-          <a:p>
             <a:endParaRPr lang="en-US" dirty="0" smtClean="0"/>
           </a:p>
           <a:p>
@@ -5913,7 +5946,6 @@
               <a:rPr lang="en-US" dirty="0" smtClean="0"/>
               <a:t>Learning new libraries takes time</a:t>
             </a:r>
-            <a:endParaRPr lang="en-US" dirty="0" smtClean="0"/>
           </a:p>
         </p:txBody>
       </p:sp>

</xml_diff>

<commit_message>
put a null check
</commit_message>
<xml_diff>
--- a/Final presentation slides.pptx
+++ b/Final presentation slides.pptx
@@ -4171,9 +4171,16 @@
           <a:bodyPr/>
           <a:lstStyle/>
           <a:p>
+            <a:endParaRPr lang="en-US" smtClean="0"/>
+          </a:p>
+          <a:p>
+            <a:r>
+              <a:rPr lang="en-US" smtClean="0"/>
+              <a:t>Realizing </a:t>
+            </a:r>
             <a:r>
               <a:rPr lang="en-US" dirty="0" smtClean="0"/>
-              <a:t>Realizing too late how big of a hole you’ve dug yourself</a:t>
+              <a:t>too late how big of a hole you’ve dug yourself</a:t>
             </a:r>
           </a:p>
           <a:p>

</xml_diff>